<commit_message>
added Addicks Reservoir summary to analysis
</commit_message>
<xml_diff>
--- a/reports/presentation_FINAL.pptx
+++ b/reports/presentation_FINAL.pptx
@@ -282,7 +282,7 @@
           <a:p>
             <a:fld id="{7815AAF6-D9AF-47C3-92DD-99476B64B79F}" type="datetimeFigureOut">
               <a:rPr lang="en-US" smtClean="0"/>
-              <a:t>1/21/2019</a:t>
+              <a:t>1/22/2019</a:t>
             </a:fld>
             <a:endParaRPr lang="en-US"/>
           </a:p>
@@ -480,7 +480,7 @@
           <a:p>
             <a:fld id="{7815AAF6-D9AF-47C3-92DD-99476B64B79F}" type="datetimeFigureOut">
               <a:rPr lang="en-US" smtClean="0"/>
-              <a:t>1/21/2019</a:t>
+              <a:t>1/22/2019</a:t>
             </a:fld>
             <a:endParaRPr lang="en-US"/>
           </a:p>
@@ -688,7 +688,7 @@
           <a:p>
             <a:fld id="{7815AAF6-D9AF-47C3-92DD-99476B64B79F}" type="datetimeFigureOut">
               <a:rPr lang="en-US" smtClean="0"/>
-              <a:t>1/21/2019</a:t>
+              <a:t>1/22/2019</a:t>
             </a:fld>
             <a:endParaRPr lang="en-US"/>
           </a:p>
@@ -886,7 +886,7 @@
           <a:p>
             <a:fld id="{7815AAF6-D9AF-47C3-92DD-99476B64B79F}" type="datetimeFigureOut">
               <a:rPr lang="en-US" smtClean="0"/>
-              <a:t>1/21/2019</a:t>
+              <a:t>1/22/2019</a:t>
             </a:fld>
             <a:endParaRPr lang="en-US"/>
           </a:p>
@@ -1161,7 +1161,7 @@
           <a:p>
             <a:fld id="{7815AAF6-D9AF-47C3-92DD-99476B64B79F}" type="datetimeFigureOut">
               <a:rPr lang="en-US" smtClean="0"/>
-              <a:t>1/21/2019</a:t>
+              <a:t>1/22/2019</a:t>
             </a:fld>
             <a:endParaRPr lang="en-US"/>
           </a:p>
@@ -1426,7 +1426,7 @@
           <a:p>
             <a:fld id="{7815AAF6-D9AF-47C3-92DD-99476B64B79F}" type="datetimeFigureOut">
               <a:rPr lang="en-US" smtClean="0"/>
-              <a:t>1/21/2019</a:t>
+              <a:t>1/22/2019</a:t>
             </a:fld>
             <a:endParaRPr lang="en-US"/>
           </a:p>
@@ -1838,7 +1838,7 @@
           <a:p>
             <a:fld id="{7815AAF6-D9AF-47C3-92DD-99476B64B79F}" type="datetimeFigureOut">
               <a:rPr lang="en-US" smtClean="0"/>
-              <a:t>1/21/2019</a:t>
+              <a:t>1/22/2019</a:t>
             </a:fld>
             <a:endParaRPr lang="en-US"/>
           </a:p>
@@ -1979,7 +1979,7 @@
           <a:p>
             <a:fld id="{7815AAF6-D9AF-47C3-92DD-99476B64B79F}" type="datetimeFigureOut">
               <a:rPr lang="en-US" smtClean="0"/>
-              <a:t>1/21/2019</a:t>
+              <a:t>1/22/2019</a:t>
             </a:fld>
             <a:endParaRPr lang="en-US"/>
           </a:p>
@@ -2092,7 +2092,7 @@
           <a:p>
             <a:fld id="{7815AAF6-D9AF-47C3-92DD-99476B64B79F}" type="datetimeFigureOut">
               <a:rPr lang="en-US" smtClean="0"/>
-              <a:t>1/21/2019</a:t>
+              <a:t>1/22/2019</a:t>
             </a:fld>
             <a:endParaRPr lang="en-US"/>
           </a:p>
@@ -2403,7 +2403,7 @@
           <a:p>
             <a:fld id="{7815AAF6-D9AF-47C3-92DD-99476B64B79F}" type="datetimeFigureOut">
               <a:rPr lang="en-US" smtClean="0"/>
-              <a:t>1/21/2019</a:t>
+              <a:t>1/22/2019</a:t>
             </a:fld>
             <a:endParaRPr lang="en-US"/>
           </a:p>
@@ -2691,7 +2691,7 @@
           <a:p>
             <a:fld id="{7815AAF6-D9AF-47C3-92DD-99476B64B79F}" type="datetimeFigureOut">
               <a:rPr lang="en-US" smtClean="0"/>
-              <a:t>1/21/2019</a:t>
+              <a:t>1/22/2019</a:t>
             </a:fld>
             <a:endParaRPr lang="en-US"/>
           </a:p>
@@ -2932,7 +2932,7 @@
           <a:p>
             <a:fld id="{7815AAF6-D9AF-47C3-92DD-99476B64B79F}" type="datetimeFigureOut">
               <a:rPr lang="en-US" smtClean="0"/>
-              <a:t>1/21/2019</a:t>
+              <a:t>1/22/2019</a:t>
             </a:fld>
             <a:endParaRPr lang="en-US"/>
           </a:p>
@@ -3498,7 +3498,7 @@
             <a:pPr algn="ctr"/>
             <a:r>
               <a:rPr lang="en-US" sz="3700" b="1" spc="100" dirty="0"/>
-              <a:t>Buffalo Bayou Flood Risk Reduction for Next Harvey</a:t>
+              <a:t>Upstream Flood Risk Reduction for Next Harvey</a:t>
             </a:r>
           </a:p>
         </p:txBody>
@@ -4042,8 +4042,8 @@
         </p:nvSpPr>
         <p:spPr>
           <a:xfrm>
-            <a:off x="4165600" y="1690688"/>
-            <a:ext cx="3860800" cy="4448013"/>
+            <a:off x="2039007" y="1690688"/>
+            <a:ext cx="8586951" cy="4448013"/>
           </a:xfrm>
           <a:prstGeom prst="rect">
             <a:avLst/>
@@ -4065,7 +4065,7 @@
             </a:pPr>
             <a:r>
               <a:rPr lang="en-US" sz="3200" dirty="0"/>
-              <a:t>Number 1 - Doug</a:t>
+              <a:t>Addicks and Barker Reservoirs - Constant Threat</a:t>
             </a:r>
           </a:p>
           <a:p>
@@ -4078,7 +4078,7 @@
             </a:pPr>
             <a:r>
               <a:rPr lang="en-US" sz="3200" dirty="0"/>
-              <a:t>Number 2 - Doug</a:t>
+              <a:t>Future Buffalo  Bayou Flooding - High Risk </a:t>
             </a:r>
           </a:p>
           <a:p>
@@ -4130,7 +4130,7 @@
             </a:pPr>
             <a:r>
               <a:rPr lang="en-US" sz="3200" dirty="0"/>
-              <a:t>Number 6 - Lesly</a:t>
+              <a:t>Number 6 - Lesly </a:t>
             </a:r>
           </a:p>
         </p:txBody>

</xml_diff>